<commit_message>
Update Stimulus saliency modulates the coordination of visual cortex.pptx
</commit_message>
<xml_diff>
--- a/Project/Stimulus saliency modulates the coordination of visual cortex.pptx
+++ b/Project/Stimulus saliency modulates the coordination of visual cortex.pptx
@@ -3776,11 +3776,11 @@
           <a:lstStyle/>
           <a:p>
             <a:r>
-              <a:rPr lang="en-US" altLang="zh-CN" dirty="0">
+              <a:rPr lang="en-US" altLang="zh-CN">
                 <a:latin typeface="Arial" panose="020B0604020202020204" pitchFamily="34" charset="0"/>
                 <a:cs typeface="Arial" panose="020B0604020202020204" pitchFamily="34" charset="0"/>
               </a:rPr>
-              <a:t>Assumption</a:t>
+              <a:t>Hypothesis</a:t>
             </a:r>
             <a:endParaRPr lang="zh-CN" altLang="en-US" dirty="0">
               <a:latin typeface="Arial" panose="020B0604020202020204" pitchFamily="34" charset="0"/>

</xml_diff>